<commit_message>
Removed all credential.json files
</commit_message>
<xml_diff>
--- a/sample_presentations/sample_1.pptx
+++ b/sample_presentations/sample_1.pptx
@@ -107,7 +107,49 @@
       </a:defRPr>
     </a:lvl9pPr>
   </p:defaultTextStyle>
+  <p:extLst>
+    <p:ext uri="{EFAFB233-063F-42B5-8137-9DF3F51BA10A}">
+      <p15:sldGuideLst xmlns:p15="http://schemas.microsoft.com/office/powerpoint/2012/main"/>
+    </p:ext>
+  </p:extLst>
 </p:presentation>
+</file>
+
+<file path=ppt/revisionInfo.xml><?xml version="1.0" encoding="utf-8"?>
+<p1510:revInfo xmlns:a="http://schemas.openxmlformats.org/drawingml/2006/main" xmlns:r="http://schemas.openxmlformats.org/officeDocument/2006/relationships" xmlns:p1510="http://schemas.microsoft.com/office/powerpoint/2015/10/main">
+  <p1510:revLst>
+    <p1510:client id="{38737C8A-EBAC-4638-A7DB-1A88FFF9570B}" v="23" dt="2024-03-02T03:18:11.234"/>
+  </p1510:revLst>
+</p1510:revInfo>
+</file>
+
+<file path=ppt/changesInfos/changesInfo1.xml><?xml version="1.0" encoding="utf-8"?>
+<pc:chgInfo xmlns:a="http://schemas.openxmlformats.org/drawingml/2006/main" xmlns:r="http://schemas.openxmlformats.org/officeDocument/2006/relationships" xmlns:ac="http://schemas.microsoft.com/office/drawing/2013/main/command" xmlns:pc="http://schemas.microsoft.com/office/powerpoint/2013/main/command">
+  <pc:docChgLst>
+    <pc:chgData name="Owen Liang" userId="2aa77376dd919880" providerId="Windows Live" clId="Web-{38737C8A-EBAC-4638-A7DB-1A88FFF9570B}"/>
+    <pc:docChg chg="modSld">
+      <pc:chgData name="Owen Liang" userId="2aa77376dd919880" providerId="Windows Live" clId="Web-{38737C8A-EBAC-4638-A7DB-1A88FFF9570B}" dt="2024-03-02T03:18:11.234" v="21" actId="20577"/>
+      <pc:docMkLst>
+        <pc:docMk/>
+      </pc:docMkLst>
+      <pc:sldChg chg="modSp">
+        <pc:chgData name="Owen Liang" userId="2aa77376dd919880" providerId="Windows Live" clId="Web-{38737C8A-EBAC-4638-A7DB-1A88FFF9570B}" dt="2024-03-02T03:18:11.234" v="21" actId="20577"/>
+        <pc:sldMkLst>
+          <pc:docMk/>
+          <pc:sldMk cId="689639987" sldId="258"/>
+        </pc:sldMkLst>
+        <pc:spChg chg="mod">
+          <ac:chgData name="Owen Liang" userId="2aa77376dd919880" providerId="Windows Live" clId="Web-{38737C8A-EBAC-4638-A7DB-1A88FFF9570B}" dt="2024-03-02T03:18:11.234" v="21" actId="20577"/>
+          <ac:spMkLst>
+            <pc:docMk/>
+            <pc:sldMk cId="689639987" sldId="258"/>
+            <ac:spMk id="3" creationId="{302BBE49-DA20-D5B5-1D29-E6543D681F06}"/>
+          </ac:spMkLst>
+        </pc:spChg>
+      </pc:sldChg>
+    </pc:docChg>
+  </pc:docChgLst>
+</pc:chgInfo>
 </file>
 
 <file path=ppt/slideLayouts/slideLayout1.xml><?xml version="1.0" encoding="utf-8"?>
@@ -259,7 +301,7 @@
           <a:p>
             <a:fld id="{6CFDD072-0A7C-FA4A-A0F6-DAECCCD11B51}" type="datetimeFigureOut">
               <a:rPr lang="en-US" smtClean="0"/>
-              <a:t>3/1/24</a:t>
+              <a:t>3/1/2024</a:t>
             </a:fld>
             <a:endParaRPr lang="en-US"/>
           </a:p>
@@ -459,7 +501,7 @@
           <a:p>
             <a:fld id="{6CFDD072-0A7C-FA4A-A0F6-DAECCCD11B51}" type="datetimeFigureOut">
               <a:rPr lang="en-US" smtClean="0"/>
-              <a:t>3/1/24</a:t>
+              <a:t>3/1/2024</a:t>
             </a:fld>
             <a:endParaRPr lang="en-US"/>
           </a:p>
@@ -669,7 +711,7 @@
           <a:p>
             <a:fld id="{6CFDD072-0A7C-FA4A-A0F6-DAECCCD11B51}" type="datetimeFigureOut">
               <a:rPr lang="en-US" smtClean="0"/>
-              <a:t>3/1/24</a:t>
+              <a:t>3/1/2024</a:t>
             </a:fld>
             <a:endParaRPr lang="en-US"/>
           </a:p>
@@ -869,7 +911,7 @@
           <a:p>
             <a:fld id="{6CFDD072-0A7C-FA4A-A0F6-DAECCCD11B51}" type="datetimeFigureOut">
               <a:rPr lang="en-US" smtClean="0"/>
-              <a:t>3/1/24</a:t>
+              <a:t>3/1/2024</a:t>
             </a:fld>
             <a:endParaRPr lang="en-US"/>
           </a:p>
@@ -1145,7 +1187,7 @@
           <a:p>
             <a:fld id="{6CFDD072-0A7C-FA4A-A0F6-DAECCCD11B51}" type="datetimeFigureOut">
               <a:rPr lang="en-US" smtClean="0"/>
-              <a:t>3/1/24</a:t>
+              <a:t>3/1/2024</a:t>
             </a:fld>
             <a:endParaRPr lang="en-US"/>
           </a:p>
@@ -1413,7 +1455,7 @@
           <a:p>
             <a:fld id="{6CFDD072-0A7C-FA4A-A0F6-DAECCCD11B51}" type="datetimeFigureOut">
               <a:rPr lang="en-US" smtClean="0"/>
-              <a:t>3/1/24</a:t>
+              <a:t>3/1/2024</a:t>
             </a:fld>
             <a:endParaRPr lang="en-US"/>
           </a:p>
@@ -1828,7 +1870,7 @@
           <a:p>
             <a:fld id="{6CFDD072-0A7C-FA4A-A0F6-DAECCCD11B51}" type="datetimeFigureOut">
               <a:rPr lang="en-US" smtClean="0"/>
-              <a:t>3/1/24</a:t>
+              <a:t>3/1/2024</a:t>
             </a:fld>
             <a:endParaRPr lang="en-US"/>
           </a:p>
@@ -1970,7 +2012,7 @@
           <a:p>
             <a:fld id="{6CFDD072-0A7C-FA4A-A0F6-DAECCCD11B51}" type="datetimeFigureOut">
               <a:rPr lang="en-US" smtClean="0"/>
-              <a:t>3/1/24</a:t>
+              <a:t>3/1/2024</a:t>
             </a:fld>
             <a:endParaRPr lang="en-US"/>
           </a:p>
@@ -2083,7 +2125,7 @@
           <a:p>
             <a:fld id="{6CFDD072-0A7C-FA4A-A0F6-DAECCCD11B51}" type="datetimeFigureOut">
               <a:rPr lang="en-US" smtClean="0"/>
-              <a:t>3/1/24</a:t>
+              <a:t>3/1/2024</a:t>
             </a:fld>
             <a:endParaRPr lang="en-US"/>
           </a:p>
@@ -2396,7 +2438,7 @@
           <a:p>
             <a:fld id="{6CFDD072-0A7C-FA4A-A0F6-DAECCCD11B51}" type="datetimeFigureOut">
               <a:rPr lang="en-US" smtClean="0"/>
-              <a:t>3/1/24</a:t>
+              <a:t>3/1/2024</a:t>
             </a:fld>
             <a:endParaRPr lang="en-US"/>
           </a:p>
@@ -2685,7 +2727,7 @@
           <a:p>
             <a:fld id="{6CFDD072-0A7C-FA4A-A0F6-DAECCCD11B51}" type="datetimeFigureOut">
               <a:rPr lang="en-US" smtClean="0"/>
-              <a:t>3/1/24</a:t>
+              <a:t>3/1/2024</a:t>
             </a:fld>
             <a:endParaRPr lang="en-US"/>
           </a:p>
@@ -2928,7 +2970,7 @@
           <a:p>
             <a:fld id="{6CFDD072-0A7C-FA4A-A0F6-DAECCCD11B51}" type="datetimeFigureOut">
               <a:rPr lang="en-US" smtClean="0"/>
-              <a:t>3/1/24</a:t>
+              <a:t>3/1/2024</a:t>
             </a:fld>
             <a:endParaRPr lang="en-US"/>
           </a:p>
@@ -3569,7 +3611,9 @@
         </p:nvSpPr>
         <p:spPr/>
         <p:txBody>
-          <a:bodyPr/>
+          <a:bodyPr vert="horz" lIns="91440" tIns="45720" rIns="91440" bIns="45720" rtlCol="0" anchor="t">
+            <a:normAutofit/>
+          </a:bodyPr>
           <a:lstStyle/>
           <a:p>
             <a:r>
@@ -3582,6 +3626,9 @@
               <a:rPr lang="en-US" dirty="0"/>
               <a:t>Both of these points are dot points</a:t>
             </a:r>
+            <a:endParaRPr lang="en-US" dirty="0">
+              <a:cs typeface="Calibri"/>
+            </a:endParaRPr>
           </a:p>
         </p:txBody>
       </p:sp>

</xml_diff>